<commit_message>
fixed reinforcement weight adjustment, training still to be done
</commit_message>
<xml_diff>
--- a/Docs/poster.pptx
+++ b/Docs/poster.pptx
@@ -104,6 +104,11 @@
       </a:defRPr>
     </a:lvl9pPr>
   </p:defaultTextStyle>
+  <p:extLst>
+    <p:ext uri="{EFAFB233-063F-42B5-8137-9DF3F51BA10A}">
+      <p15:sldGuideLst xmlns:p15="http://schemas.microsoft.com/office/powerpoint/2012/main"/>
+    </p:ext>
+  </p:extLst>
 </p:presentation>
 </file>
 
@@ -238,7 +243,7 @@
           <a:p>
             <a:fld id="{BACFE7C1-4C43-40AE-8290-B34D6B637446}" type="datetimeFigureOut">
               <a:rPr lang="en-IE" smtClean="0"/>
-              <a:t>17/04/2021</a:t>
+              <a:t>20/04/2021</a:t>
             </a:fld>
             <a:endParaRPr lang="en-IE"/>
           </a:p>
@@ -408,7 +413,7 @@
           <a:p>
             <a:fld id="{BACFE7C1-4C43-40AE-8290-B34D6B637446}" type="datetimeFigureOut">
               <a:rPr lang="en-IE" smtClean="0"/>
-              <a:t>17/04/2021</a:t>
+              <a:t>20/04/2021</a:t>
             </a:fld>
             <a:endParaRPr lang="en-IE"/>
           </a:p>
@@ -588,7 +593,7 @@
           <a:p>
             <a:fld id="{BACFE7C1-4C43-40AE-8290-B34D6B637446}" type="datetimeFigureOut">
               <a:rPr lang="en-IE" smtClean="0"/>
-              <a:t>17/04/2021</a:t>
+              <a:t>20/04/2021</a:t>
             </a:fld>
             <a:endParaRPr lang="en-IE"/>
           </a:p>
@@ -758,7 +763,7 @@
           <a:p>
             <a:fld id="{BACFE7C1-4C43-40AE-8290-B34D6B637446}" type="datetimeFigureOut">
               <a:rPr lang="en-IE" smtClean="0"/>
-              <a:t>17/04/2021</a:t>
+              <a:t>20/04/2021</a:t>
             </a:fld>
             <a:endParaRPr lang="en-IE"/>
           </a:p>
@@ -1002,7 +1007,7 @@
           <a:p>
             <a:fld id="{BACFE7C1-4C43-40AE-8290-B34D6B637446}" type="datetimeFigureOut">
               <a:rPr lang="en-IE" smtClean="0"/>
-              <a:t>17/04/2021</a:t>
+              <a:t>20/04/2021</a:t>
             </a:fld>
             <a:endParaRPr lang="en-IE"/>
           </a:p>
@@ -1234,7 +1239,7 @@
           <a:p>
             <a:fld id="{BACFE7C1-4C43-40AE-8290-B34D6B637446}" type="datetimeFigureOut">
               <a:rPr lang="en-IE" smtClean="0"/>
-              <a:t>17/04/2021</a:t>
+              <a:t>20/04/2021</a:t>
             </a:fld>
             <a:endParaRPr lang="en-IE"/>
           </a:p>
@@ -1601,7 +1606,7 @@
           <a:p>
             <a:fld id="{BACFE7C1-4C43-40AE-8290-B34D6B637446}" type="datetimeFigureOut">
               <a:rPr lang="en-IE" smtClean="0"/>
-              <a:t>17/04/2021</a:t>
+              <a:t>20/04/2021</a:t>
             </a:fld>
             <a:endParaRPr lang="en-IE"/>
           </a:p>
@@ -1719,7 +1724,7 @@
           <a:p>
             <a:fld id="{BACFE7C1-4C43-40AE-8290-B34D6B637446}" type="datetimeFigureOut">
               <a:rPr lang="en-IE" smtClean="0"/>
-              <a:t>17/04/2021</a:t>
+              <a:t>20/04/2021</a:t>
             </a:fld>
             <a:endParaRPr lang="en-IE"/>
           </a:p>
@@ -1814,7 +1819,7 @@
           <a:p>
             <a:fld id="{BACFE7C1-4C43-40AE-8290-B34D6B637446}" type="datetimeFigureOut">
               <a:rPr lang="en-IE" smtClean="0"/>
-              <a:t>17/04/2021</a:t>
+              <a:t>20/04/2021</a:t>
             </a:fld>
             <a:endParaRPr lang="en-IE"/>
           </a:p>
@@ -2091,7 +2096,7 @@
           <a:p>
             <a:fld id="{BACFE7C1-4C43-40AE-8290-B34D6B637446}" type="datetimeFigureOut">
               <a:rPr lang="en-IE" smtClean="0"/>
-              <a:t>17/04/2021</a:t>
+              <a:t>20/04/2021</a:t>
             </a:fld>
             <a:endParaRPr lang="en-IE"/>
           </a:p>
@@ -2348,7 +2353,7 @@
           <a:p>
             <a:fld id="{BACFE7C1-4C43-40AE-8290-B34D6B637446}" type="datetimeFigureOut">
               <a:rPr lang="en-IE" smtClean="0"/>
-              <a:t>17/04/2021</a:t>
+              <a:t>20/04/2021</a:t>
             </a:fld>
             <a:endParaRPr lang="en-IE"/>
           </a:p>
@@ -2561,7 +2566,7 @@
           <a:p>
             <a:fld id="{BACFE7C1-4C43-40AE-8290-B34D6B637446}" type="datetimeFigureOut">
               <a:rPr lang="en-IE" smtClean="0"/>
-              <a:t>17/04/2021</a:t>
+              <a:t>20/04/2021</a:t>
             </a:fld>
             <a:endParaRPr lang="en-IE"/>
           </a:p>
@@ -3342,7 +3347,7 @@
         <p:spPr>
           <a:xfrm>
             <a:off x="120649" y="2586692"/>
-            <a:ext cx="3041651" cy="4401205"/>
+            <a:ext cx="3041651" cy="3231654"/>
           </a:xfrm>
           <a:prstGeom prst="rect">
             <a:avLst/>
@@ -3364,18 +3369,14 @@
               </a:spcAft>
             </a:pPr>
             <a:r>
-              <a:rPr lang="en-GB" sz="1400" b="0" i="0" u="none" strike="noStrike" dirty="0">
+              <a:rPr lang="en-GB" sz="1200" dirty="0">
                 <a:solidFill>
                   <a:srgbClr val="000000"/>
                 </a:solidFill>
-                <a:effectLst/>
                 <a:latin typeface="Arial" panose="020B0604020202020204" pitchFamily="34" charset="0"/>
               </a:rPr>
               <a:t>AI and machine learning has been a topic in discussion since the 60’s and now more than ever is being applied to software across the world. From social media to video games to self-driving cars, machine learning is playing a prominent part in our everyday life and will continue to do so for the foreseeable future. With this in mind, my main aim for this paper is to provide an in-depth and realistic comparison between two learning techniques for neural networks, Reinforcement learning and Backpropagation, when applied to moving a car around a track. Comparisons will be made such as time taken to complete a lap, ease of implementation and efficiency. </a:t>
             </a:r>
-            <a:endParaRPr lang="en-GB" sz="1400" b="0" dirty="0">
-              <a:effectLst/>
-            </a:endParaRPr>
           </a:p>
         </p:txBody>
       </p:sp>
@@ -3401,7 +3402,7 @@
         </p:blipFill>
         <p:spPr>
           <a:xfrm>
-            <a:off x="188131" y="7376468"/>
+            <a:off x="185952" y="6202310"/>
             <a:ext cx="2906685" cy="1889394"/>
           </a:xfrm>
           <a:prstGeom prst="rect">
@@ -3454,7 +3455,7 @@
         <p:spPr>
           <a:xfrm>
             <a:off x="3162300" y="3651206"/>
-            <a:ext cx="2573742" cy="5047536"/>
+            <a:ext cx="2573742" cy="3600986"/>
           </a:xfrm>
           <a:prstGeom prst="rect">
             <a:avLst/>
@@ -3468,7 +3469,7 @@
           <a:lstStyle/>
           <a:p>
             <a:r>
-              <a:rPr lang="en-GB" sz="1400" dirty="0">
+              <a:rPr lang="en-GB" sz="1200" dirty="0">
                 <a:solidFill>
                   <a:srgbClr val="000000"/>
                 </a:solidFill>
@@ -3479,7 +3480,7 @@
           </a:p>
           <a:p>
             <a:r>
-              <a:rPr lang="en-GB" sz="1400" dirty="0">
+              <a:rPr lang="en-GB" sz="1200" dirty="0">
                 <a:solidFill>
                   <a:srgbClr val="000000"/>
                 </a:solidFill>
@@ -3490,7 +3491,7 @@
           </a:p>
           <a:p>
             <a:r>
-              <a:rPr lang="en-GB" sz="1400" dirty="0">
+              <a:rPr lang="en-GB" sz="1200" dirty="0">
                 <a:solidFill>
                   <a:srgbClr val="000000"/>
                 </a:solidFill>
@@ -3530,8 +3531,8 @@
         </p:blipFill>
         <p:spPr bwMode="auto">
           <a:xfrm>
-            <a:off x="5793972" y="8237253"/>
-            <a:ext cx="2543175" cy="1028609"/>
+            <a:off x="3206663" y="7289039"/>
+            <a:ext cx="2529380" cy="1223824"/>
           </a:xfrm>
           <a:prstGeom prst="rect">
             <a:avLst/>
@@ -3563,7 +3564,7 @@
         <p:spPr>
           <a:xfrm>
             <a:off x="5803526" y="2788502"/>
-            <a:ext cx="2573742" cy="5478423"/>
+            <a:ext cx="2573742" cy="3785652"/>
           </a:xfrm>
           <a:prstGeom prst="rect">
             <a:avLst/>
@@ -3577,7 +3578,7 @@
           <a:lstStyle/>
           <a:p>
             <a:r>
-              <a:rPr lang="en-GB" sz="1400" dirty="0">
+              <a:rPr lang="en-GB" sz="1200" dirty="0">
                 <a:solidFill>
                   <a:srgbClr val="000000"/>
                 </a:solidFill>
@@ -3588,7 +3589,7 @@
           </a:p>
           <a:p>
             <a:r>
-              <a:rPr lang="en-GB" sz="1400" dirty="0">
+              <a:rPr lang="en-GB" sz="1200" dirty="0">
                 <a:solidFill>
                   <a:srgbClr val="000000"/>
                 </a:solidFill>
@@ -3599,7 +3600,7 @@
           </a:p>
           <a:p>
             <a:r>
-              <a:rPr lang="en-GB" sz="1400" dirty="0">
+              <a:rPr lang="en-GB" sz="1200" dirty="0">
                 <a:solidFill>
                   <a:srgbClr val="000000"/>
                 </a:solidFill>
@@ -3607,7 +3608,7 @@
               </a:rPr>
               <a:t>Reinforcement learning took a lot longer to calculate accurately, having to use trial and error to compute its outputs. Despite this, Reinforcement learning resulted in a far more accurate model despite being harder to implement.  </a:t>
             </a:r>
-            <a:endParaRPr lang="en-IE" sz="1400" dirty="0">
+            <a:endParaRPr lang="en-IE" sz="1200" dirty="0">
               <a:solidFill>
                 <a:srgbClr val="000000"/>
               </a:solidFill>
@@ -3783,6 +3784,237 @@
               <a:buChar char="•"/>
             </a:pPr>
             <a:endParaRPr lang="en-IE" sz="1400" dirty="0">
+              <a:solidFill>
+                <a:srgbClr val="000000"/>
+              </a:solidFill>
+              <a:latin typeface="Arial" panose="020B0604020202020204" pitchFamily="34" charset="0"/>
+            </a:endParaRPr>
+          </a:p>
+        </p:txBody>
+      </p:sp>
+      <p:sp>
+        <p:nvSpPr>
+          <p:cNvPr id="2" name="Rectangle 1">
+            <a:extLst>
+              <a:ext uri="{FF2B5EF4-FFF2-40B4-BE49-F238E27FC236}">
+                <a16:creationId xmlns:a16="http://schemas.microsoft.com/office/drawing/2014/main" id="{4725EE57-7FA7-454D-8E9C-5344027BB558}"/>
+              </a:ext>
+            </a:extLst>
+          </p:cNvPr>
+          <p:cNvSpPr/>
+          <p:nvPr/>
+        </p:nvSpPr>
+        <p:spPr>
+          <a:xfrm>
+            <a:off x="1" y="8585536"/>
+            <a:ext cx="3162300" cy="1015663"/>
+          </a:xfrm>
+          <a:prstGeom prst="rect">
+            <a:avLst/>
+          </a:prstGeom>
+        </p:spPr>
+        <p:style>
+          <a:lnRef idx="1">
+            <a:schemeClr val="accent3"/>
+          </a:lnRef>
+          <a:fillRef idx="2">
+            <a:schemeClr val="accent3"/>
+          </a:fillRef>
+          <a:effectRef idx="1">
+            <a:schemeClr val="accent3"/>
+          </a:effectRef>
+          <a:fontRef idx="minor">
+            <a:schemeClr val="dk1"/>
+          </a:fontRef>
+        </p:style>
+        <p:txBody>
+          <a:bodyPr rtlCol="0" anchor="ctr"/>
+          <a:lstStyle/>
+          <a:p>
+            <a:pPr algn="ctr"/>
+            <a:endParaRPr lang="en-IE"/>
+          </a:p>
+        </p:txBody>
+      </p:sp>
+      <p:pic>
+        <p:nvPicPr>
+          <p:cNvPr id="8" name="Picture 7" descr="Chart, bar chart&#10;&#10;Description automatically generated">
+            <a:extLst>
+              <a:ext uri="{FF2B5EF4-FFF2-40B4-BE49-F238E27FC236}">
+                <a16:creationId xmlns:a16="http://schemas.microsoft.com/office/drawing/2014/main" id="{0123C8BA-39CE-464C-ABAA-FDE07FEDA415}"/>
+              </a:ext>
+            </a:extLst>
+          </p:cNvPr>
+          <p:cNvPicPr>
+            <a:picLocks noChangeAspect="1"/>
+          </p:cNvPicPr>
+          <p:nvPr/>
+        </p:nvPicPr>
+        <p:blipFill>
+          <a:blip r:embed="rId6">
+            <a:extLst>
+              <a:ext uri="{28A0092B-C50C-407E-A947-70E740481C1C}">
+                <a14:useLocalDpi xmlns:a14="http://schemas.microsoft.com/office/drawing/2010/main" val="0"/>
+              </a:ext>
+            </a:extLst>
+          </a:blip>
+          <a:stretch>
+            <a:fillRect/>
+          </a:stretch>
+        </p:blipFill>
+        <p:spPr>
+          <a:xfrm>
+            <a:off x="5803526" y="6599633"/>
+            <a:ext cx="2636600" cy="1305117"/>
+          </a:xfrm>
+          <a:prstGeom prst="rect">
+            <a:avLst/>
+          </a:prstGeom>
+        </p:spPr>
+      </p:pic>
+      <p:pic>
+        <p:nvPicPr>
+          <p:cNvPr id="15" name="Picture 14" descr="Chart, pie chart&#10;&#10;Description automatically generated">
+            <a:extLst>
+              <a:ext uri="{FF2B5EF4-FFF2-40B4-BE49-F238E27FC236}">
+                <a16:creationId xmlns:a16="http://schemas.microsoft.com/office/drawing/2014/main" id="{356301A1-8A5D-46ED-8FDD-ADD529849B89}"/>
+              </a:ext>
+            </a:extLst>
+          </p:cNvPr>
+          <p:cNvPicPr>
+            <a:picLocks noChangeAspect="1"/>
+          </p:cNvPicPr>
+          <p:nvPr/>
+        </p:nvPicPr>
+        <p:blipFill>
+          <a:blip r:embed="rId7">
+            <a:extLst>
+              <a:ext uri="{28A0092B-C50C-407E-A947-70E740481C1C}">
+                <a14:useLocalDpi xmlns:a14="http://schemas.microsoft.com/office/drawing/2010/main" val="0"/>
+              </a:ext>
+            </a:extLst>
+          </a:blip>
+          <a:stretch>
+            <a:fillRect/>
+          </a:stretch>
+        </p:blipFill>
+        <p:spPr>
+          <a:xfrm>
+            <a:off x="5803526" y="7930229"/>
+            <a:ext cx="1326590" cy="1532859"/>
+          </a:xfrm>
+          <a:prstGeom prst="rect">
+            <a:avLst/>
+          </a:prstGeom>
+        </p:spPr>
+      </p:pic>
+      <p:pic>
+        <p:nvPicPr>
+          <p:cNvPr id="21" name="Picture 20" descr="Chart, pie chart&#10;&#10;Description automatically generated">
+            <a:extLst>
+              <a:ext uri="{FF2B5EF4-FFF2-40B4-BE49-F238E27FC236}">
+                <a16:creationId xmlns:a16="http://schemas.microsoft.com/office/drawing/2014/main" id="{B1730C18-85C3-4EE2-8C3C-5037EE6330FF}"/>
+              </a:ext>
+            </a:extLst>
+          </p:cNvPr>
+          <p:cNvPicPr>
+            <a:picLocks noChangeAspect="1"/>
+          </p:cNvPicPr>
+          <p:nvPr/>
+        </p:nvPicPr>
+        <p:blipFill>
+          <a:blip r:embed="rId8">
+            <a:extLst>
+              <a:ext uri="{28A0092B-C50C-407E-A947-70E740481C1C}">
+                <a14:useLocalDpi xmlns:a14="http://schemas.microsoft.com/office/drawing/2010/main" val="0"/>
+              </a:ext>
+            </a:extLst>
+          </a:blip>
+          <a:stretch>
+            <a:fillRect/>
+          </a:stretch>
+        </p:blipFill>
+        <p:spPr>
+          <a:xfrm>
+            <a:off x="7197599" y="8024146"/>
+            <a:ext cx="1403750" cy="1438942"/>
+          </a:xfrm>
+          <a:prstGeom prst="rect">
+            <a:avLst/>
+          </a:prstGeom>
+        </p:spPr>
+      </p:pic>
+      <p:sp>
+        <p:nvSpPr>
+          <p:cNvPr id="22" name="TextBox 21">
+            <a:extLst>
+              <a:ext uri="{FF2B5EF4-FFF2-40B4-BE49-F238E27FC236}">
+                <a16:creationId xmlns:a16="http://schemas.microsoft.com/office/drawing/2014/main" id="{D5BF62A1-B118-4589-97D3-D8323AC2DD1D}"/>
+              </a:ext>
+            </a:extLst>
+          </p:cNvPr>
+          <p:cNvSpPr txBox="1"/>
+          <p:nvPr/>
+        </p:nvSpPr>
+        <p:spPr>
+          <a:xfrm>
+            <a:off x="120649" y="8700952"/>
+            <a:ext cx="2645411" cy="784830"/>
+          </a:xfrm>
+          <a:prstGeom prst="rect">
+            <a:avLst/>
+          </a:prstGeom>
+          <a:noFill/>
+        </p:spPr>
+        <p:txBody>
+          <a:bodyPr wrap="square" rtlCol="0">
+            <a:spAutoFit/>
+          </a:bodyPr>
+          <a:lstStyle/>
+          <a:p>
+            <a:r>
+              <a:rPr lang="en-GB" sz="1200" dirty="0">
+                <a:solidFill>
+                  <a:srgbClr val="000000"/>
+                </a:solidFill>
+                <a:latin typeface="Arial" panose="020B0604020202020204" pitchFamily="34" charset="0"/>
+              </a:rPr>
+              <a:t>Contact:</a:t>
+            </a:r>
+          </a:p>
+          <a:p>
+            <a:r>
+              <a:rPr lang="en-GB" sz="1100" dirty="0">
+                <a:solidFill>
+                  <a:srgbClr val="000000"/>
+                </a:solidFill>
+                <a:latin typeface="Arial" panose="020B0604020202020204" pitchFamily="34" charset="0"/>
+              </a:rPr>
+              <a:t>Cliona Hayden</a:t>
+            </a:r>
+          </a:p>
+          <a:p>
+            <a:r>
+              <a:rPr lang="en-GB" sz="1100" dirty="0">
+                <a:solidFill>
+                  <a:srgbClr val="000000"/>
+                </a:solidFill>
+                <a:latin typeface="Arial" panose="020B0604020202020204" pitchFamily="34" charset="0"/>
+              </a:rPr>
+              <a:t>Phone: 089 422 6133</a:t>
+            </a:r>
+          </a:p>
+          <a:p>
+            <a:r>
+              <a:rPr lang="en-GB" sz="1100" dirty="0">
+                <a:solidFill>
+                  <a:srgbClr val="000000"/>
+                </a:solidFill>
+                <a:latin typeface="Arial" panose="020B0604020202020204" pitchFamily="34" charset="0"/>
+              </a:rPr>
+              <a:t>Email: Cliona.hayden5765@gmail.com</a:t>
+            </a:r>
+            <a:endParaRPr lang="en-IE" sz="1100" dirty="0">
               <a:solidFill>
                 <a:srgbClr val="000000"/>
               </a:solidFill>

</xml_diff>